<commit_message>
prezentace pro workshop - guide completed
</commit_message>
<xml_diff>
--- a/doc/Quadient-prezentace.pptx
+++ b/doc/Quadient-prezentace.pptx
@@ -14,6 +14,7 @@
     <p:sldId id="262" r:id="rId8"/>
     <p:sldId id="263" r:id="rId9"/>
     <p:sldId id="264" r:id="rId10"/>
+    <p:sldId id="265" r:id="rId11"/>
   </p:sldIdLst>
   <p:sldSz cx="12192000" cy="6858000"/>
   <p:notesSz cx="6858000" cy="9144000"/>
@@ -12360,6 +12361,905 @@
 </p:sld>
 </file>
 
+<file path=ppt/slides/slide10.xml><?xml version="1.0" encoding="utf-8"?>
+<p:sld xmlns:a="http://schemas.openxmlformats.org/drawingml/2006/main" xmlns:r="http://schemas.openxmlformats.org/officeDocument/2006/relationships" xmlns:p="http://schemas.openxmlformats.org/presentationml/2006/main">
+  <p:cSld>
+    <p:bg>
+      <p:bgPr>
+        <a:solidFill>
+          <a:schemeClr val="bg1"/>
+        </a:solidFill>
+        <a:effectLst/>
+      </p:bgPr>
+    </p:bg>
+    <p:spTree>
+      <p:nvGrpSpPr>
+        <p:cNvPr id="1" name=""/>
+        <p:cNvGrpSpPr/>
+        <p:nvPr/>
+      </p:nvGrpSpPr>
+      <p:grpSpPr>
+        <a:xfrm>
+          <a:off x="0" y="0"/>
+          <a:ext cx="0" cy="0"/>
+          <a:chOff x="0" y="0"/>
+          <a:chExt cx="0" cy="0"/>
+        </a:xfrm>
+      </p:grpSpPr>
+      <p:sp useBgFill="1">
+        <p:nvSpPr>
+          <p:cNvPr id="10" name="Rectangle 9">
+            <a:extLst>
+              <a:ext uri="{FF2B5EF4-FFF2-40B4-BE49-F238E27FC236}">
+                <a16:creationId xmlns:a16="http://schemas.microsoft.com/office/drawing/2014/main" id="{A65AC7D1-EAA9-48F5-B509-60A7F50BF703}"/>
+              </a:ext>
+              <a:ext uri="{C183D7F6-B498-43B3-948B-1728B52AA6E4}">
+                <adec:decorative xmlns:adec="http://schemas.microsoft.com/office/drawing/2017/decorative" val="1"/>
+              </a:ext>
+            </a:extLst>
+          </p:cNvPr>
+          <p:cNvSpPr>
+            <a:spLocks noGrp="1" noRot="1" noChangeAspect="1" noMove="1" noResize="1" noEditPoints="1" noAdjustHandles="1" noChangeArrowheads="1" noChangeShapeType="1" noTextEdit="1"/>
+          </p:cNvSpPr>
+          <p:nvPr>
+            <p:extLst>
+              <p:ext uri="{386F3935-93C4-4BCD-93E2-E3B085C9AB24}">
+                <p16:designElem xmlns:p16="http://schemas.microsoft.com/office/powerpoint/2015/main" val="1"/>
+              </p:ext>
+            </p:extLst>
+          </p:nvPr>
+        </p:nvSpPr>
+        <p:spPr>
+          <a:xfrm>
+            <a:off x="0" y="0"/>
+            <a:ext cx="12192000" cy="6858000"/>
+          </a:xfrm>
+          <a:prstGeom prst="rect">
+            <a:avLst/>
+          </a:prstGeom>
+          <a:ln>
+            <a:noFill/>
+          </a:ln>
+        </p:spPr>
+        <p:style>
+          <a:lnRef idx="2">
+            <a:schemeClr val="accent1">
+              <a:shade val="50000"/>
+            </a:schemeClr>
+          </a:lnRef>
+          <a:fillRef idx="1">
+            <a:schemeClr val="accent1"/>
+          </a:fillRef>
+          <a:effectRef idx="0">
+            <a:schemeClr val="accent1"/>
+          </a:effectRef>
+          <a:fontRef idx="minor">
+            <a:schemeClr val="lt1"/>
+          </a:fontRef>
+        </p:style>
+        <p:txBody>
+          <a:bodyPr rtlCol="0" anchor="ctr"/>
+          <a:lstStyle/>
+          <a:p>
+            <a:pPr algn="ctr"/>
+            <a:endParaRPr lang="en-US" dirty="0"/>
+          </a:p>
+        </p:txBody>
+      </p:sp>
+      <p:sp useBgFill="1">
+        <p:nvSpPr>
+          <p:cNvPr id="12" name="Rectangle 11">
+            <a:extLst>
+              <a:ext uri="{FF2B5EF4-FFF2-40B4-BE49-F238E27FC236}">
+                <a16:creationId xmlns:a16="http://schemas.microsoft.com/office/drawing/2014/main" id="{D6320AF9-619A-4175-865B-5663E1AEF4C5}"/>
+              </a:ext>
+              <a:ext uri="{C183D7F6-B498-43B3-948B-1728B52AA6E4}">
+                <adec:decorative xmlns:adec="http://schemas.microsoft.com/office/drawing/2017/decorative" val="1"/>
+              </a:ext>
+            </a:extLst>
+          </p:cNvPr>
+          <p:cNvSpPr>
+            <a:spLocks noGrp="1" noRot="1" noChangeAspect="1" noMove="1" noResize="1" noEditPoints="1" noAdjustHandles="1" noChangeArrowheads="1" noChangeShapeType="1" noTextEdit="1"/>
+          </p:cNvSpPr>
+          <p:nvPr>
+            <p:extLst>
+              <p:ext uri="{386F3935-93C4-4BCD-93E2-E3B085C9AB24}">
+                <p16:designElem xmlns:p16="http://schemas.microsoft.com/office/powerpoint/2015/main" val="1"/>
+              </p:ext>
+            </p:extLst>
+          </p:nvPr>
+        </p:nvSpPr>
+        <p:spPr>
+          <a:xfrm>
+            <a:off x="0" y="0"/>
+            <a:ext cx="12192000" cy="6858000"/>
+          </a:xfrm>
+          <a:prstGeom prst="rect">
+            <a:avLst/>
+          </a:prstGeom>
+          <a:ln>
+            <a:noFill/>
+          </a:ln>
+        </p:spPr>
+        <p:style>
+          <a:lnRef idx="2">
+            <a:schemeClr val="accent1">
+              <a:shade val="50000"/>
+            </a:schemeClr>
+          </a:lnRef>
+          <a:fillRef idx="1">
+            <a:schemeClr val="accent1"/>
+          </a:fillRef>
+          <a:effectRef idx="0">
+            <a:schemeClr val="accent1"/>
+          </a:effectRef>
+          <a:fontRef idx="minor">
+            <a:schemeClr val="lt1"/>
+          </a:fontRef>
+        </p:style>
+        <p:txBody>
+          <a:bodyPr rtlCol="0" anchor="ctr"/>
+          <a:lstStyle/>
+          <a:p>
+            <a:pPr algn="ctr"/>
+            <a:endParaRPr lang="en-US"/>
+          </a:p>
+        </p:txBody>
+      </p:sp>
+      <p:cxnSp>
+        <p:nvCxnSpPr>
+          <p:cNvPr id="14" name="Straight Connector 13">
+            <a:extLst>
+              <a:ext uri="{FF2B5EF4-FFF2-40B4-BE49-F238E27FC236}">
+                <a16:creationId xmlns:a16="http://schemas.microsoft.com/office/drawing/2014/main" id="{063B6EC6-D752-4EE7-908B-F8F19E8C7FEA}"/>
+              </a:ext>
+              <a:ext uri="{C183D7F6-B498-43B3-948B-1728B52AA6E4}">
+                <adec:decorative xmlns:adec="http://schemas.microsoft.com/office/drawing/2017/decorative" val="1"/>
+              </a:ext>
+            </a:extLst>
+          </p:cNvPr>
+          <p:cNvCxnSpPr>
+            <a:cxnSpLocks noGrp="1" noRot="1" noChangeAspect="1" noMove="1" noResize="1" noEditPoints="1" noAdjustHandles="1" noChangeArrowheads="1" noChangeShapeType="1"/>
+          </p:cNvCxnSpPr>
+          <p:nvPr>
+            <p:extLst>
+              <p:ext uri="{386F3935-93C4-4BCD-93E2-E3B085C9AB24}">
+                <p16:designElem xmlns:p16="http://schemas.microsoft.com/office/powerpoint/2015/main" val="1"/>
+              </p:ext>
+            </p:extLst>
+          </p:nvPr>
+        </p:nvCxnSpPr>
+        <p:spPr>
+          <a:xfrm>
+            <a:off x="5111313" y="0"/>
+            <a:ext cx="1219200" cy="6858000"/>
+          </a:xfrm>
+          <a:prstGeom prst="line">
+            <a:avLst/>
+          </a:prstGeom>
+          <a:ln w="9525">
+            <a:solidFill>
+              <a:schemeClr val="accent1">
+                <a:lumMod val="75000"/>
+              </a:schemeClr>
+            </a:solidFill>
+          </a:ln>
+        </p:spPr>
+        <p:style>
+          <a:lnRef idx="2">
+            <a:schemeClr val="accent1"/>
+          </a:lnRef>
+          <a:fillRef idx="0">
+            <a:schemeClr val="accent1"/>
+          </a:fillRef>
+          <a:effectRef idx="1">
+            <a:schemeClr val="accent1"/>
+          </a:effectRef>
+          <a:fontRef idx="minor">
+            <a:schemeClr val="tx1"/>
+          </a:fontRef>
+        </p:style>
+      </p:cxnSp>
+      <p:cxnSp>
+        <p:nvCxnSpPr>
+          <p:cNvPr id="16" name="Straight Connector 15">
+            <a:extLst>
+              <a:ext uri="{FF2B5EF4-FFF2-40B4-BE49-F238E27FC236}">
+                <a16:creationId xmlns:a16="http://schemas.microsoft.com/office/drawing/2014/main" id="{EFECD4E8-AD3E-4228-82A2-9461958EA94D}"/>
+              </a:ext>
+              <a:ext uri="{C183D7F6-B498-43B3-948B-1728B52AA6E4}">
+                <adec:decorative xmlns:adec="http://schemas.microsoft.com/office/drawing/2017/decorative" val="1"/>
+              </a:ext>
+            </a:extLst>
+          </p:cNvPr>
+          <p:cNvCxnSpPr>
+            <a:cxnSpLocks noGrp="1" noRot="1" noChangeAspect="1" noMove="1" noResize="1" noEditPoints="1" noAdjustHandles="1" noChangeArrowheads="1" noChangeShapeType="1"/>
+          </p:cNvCxnSpPr>
+          <p:nvPr>
+            <p:extLst>
+              <p:ext uri="{386F3935-93C4-4BCD-93E2-E3B085C9AB24}">
+                <p16:designElem xmlns:p16="http://schemas.microsoft.com/office/powerpoint/2015/main" val="1"/>
+              </p:ext>
+            </p:extLst>
+          </p:nvPr>
+        </p:nvCxnSpPr>
+        <p:spPr>
+          <a:xfrm flipH="1">
+            <a:off x="3290979" y="3681413"/>
+            <a:ext cx="4763558" cy="3176587"/>
+          </a:xfrm>
+          <a:prstGeom prst="line">
+            <a:avLst/>
+          </a:prstGeom>
+          <a:ln w="9525">
+            <a:solidFill>
+              <a:schemeClr val="tx1">
+                <a:lumMod val="50000"/>
+                <a:lumOff val="50000"/>
+                <a:alpha val="80000"/>
+              </a:schemeClr>
+            </a:solidFill>
+          </a:ln>
+        </p:spPr>
+        <p:style>
+          <a:lnRef idx="2">
+            <a:schemeClr val="accent1"/>
+          </a:lnRef>
+          <a:fillRef idx="0">
+            <a:schemeClr val="accent1"/>
+          </a:fillRef>
+          <a:effectRef idx="1">
+            <a:schemeClr val="accent1"/>
+          </a:effectRef>
+          <a:fontRef idx="minor">
+            <a:schemeClr val="tx1"/>
+          </a:fontRef>
+        </p:style>
+      </p:cxnSp>
+      <p:sp>
+        <p:nvSpPr>
+          <p:cNvPr id="18" name="Rectangle 23">
+            <a:extLst>
+              <a:ext uri="{FF2B5EF4-FFF2-40B4-BE49-F238E27FC236}">
+                <a16:creationId xmlns:a16="http://schemas.microsoft.com/office/drawing/2014/main" id="{7E018740-5C2B-4A41-AC1A-7E68D1EC1954}"/>
+              </a:ext>
+              <a:ext uri="{C183D7F6-B498-43B3-948B-1728B52AA6E4}">
+                <adec:decorative xmlns:adec="http://schemas.microsoft.com/office/drawing/2017/decorative" val="1"/>
+              </a:ext>
+            </a:extLst>
+          </p:cNvPr>
+          <p:cNvSpPr>
+            <a:spLocks noGrp="1" noRot="1" noChangeAspect="1" noMove="1" noResize="1" noEditPoints="1" noAdjustHandles="1" noChangeArrowheads="1" noChangeShapeType="1" noTextEdit="1"/>
+          </p:cNvSpPr>
+          <p:nvPr>
+            <p:extLst>
+              <p:ext uri="{386F3935-93C4-4BCD-93E2-E3B085C9AB24}">
+                <p16:designElem xmlns:p16="http://schemas.microsoft.com/office/powerpoint/2015/main" val="1"/>
+              </p:ext>
+            </p:extLst>
+          </p:nvPr>
+        </p:nvSpPr>
+        <p:spPr>
+          <a:xfrm>
+            <a:off x="4482568" y="-8467"/>
+            <a:ext cx="3007349" cy="6866467"/>
+          </a:xfrm>
+          <a:custGeom>
+            <a:avLst/>
+            <a:gdLst/>
+            <a:ahLst/>
+            <a:cxnLst/>
+            <a:rect l="l" t="t" r="r" b="b"/>
+            <a:pathLst>
+              <a:path w="3007349" h="6866467">
+                <a:moveTo>
+                  <a:pt x="2045532" y="0"/>
+                </a:moveTo>
+                <a:lnTo>
+                  <a:pt x="3007349" y="0"/>
+                </a:lnTo>
+                <a:lnTo>
+                  <a:pt x="3007349" y="6866467"/>
+                </a:lnTo>
+                <a:lnTo>
+                  <a:pt x="0" y="6866467"/>
+                </a:lnTo>
+                <a:lnTo>
+                  <a:pt x="2045532" y="0"/>
+                </a:lnTo>
+                <a:close/>
+              </a:path>
+            </a:pathLst>
+          </a:custGeom>
+          <a:solidFill>
+            <a:schemeClr val="accent1">
+              <a:alpha val="30000"/>
+            </a:schemeClr>
+          </a:solidFill>
+          <a:ln>
+            <a:noFill/>
+          </a:ln>
+          <a:effectLst/>
+        </p:spPr>
+        <p:style>
+          <a:lnRef idx="1">
+            <a:schemeClr val="accent1"/>
+          </a:lnRef>
+          <a:fillRef idx="3">
+            <a:schemeClr val="accent1"/>
+          </a:fillRef>
+          <a:effectRef idx="2">
+            <a:schemeClr val="accent1"/>
+          </a:effectRef>
+          <a:fontRef idx="minor">
+            <a:schemeClr val="lt1"/>
+          </a:fontRef>
+        </p:style>
+      </p:sp>
+      <p:sp>
+        <p:nvSpPr>
+          <p:cNvPr id="20" name="Rectangle 25">
+            <a:extLst>
+              <a:ext uri="{FF2B5EF4-FFF2-40B4-BE49-F238E27FC236}">
+                <a16:creationId xmlns:a16="http://schemas.microsoft.com/office/drawing/2014/main" id="{166F75A4-C475-4941-8EE2-B80A06A2C1BB}"/>
+              </a:ext>
+              <a:ext uri="{C183D7F6-B498-43B3-948B-1728B52AA6E4}">
+                <adec:decorative xmlns:adec="http://schemas.microsoft.com/office/drawing/2017/decorative" val="1"/>
+              </a:ext>
+            </a:extLst>
+          </p:cNvPr>
+          <p:cNvSpPr>
+            <a:spLocks noGrp="1" noRot="1" noChangeAspect="1" noMove="1" noResize="1" noEditPoints="1" noAdjustHandles="1" noChangeArrowheads="1" noChangeShapeType="1" noTextEdit="1"/>
+          </p:cNvSpPr>
+          <p:nvPr>
+            <p:extLst>
+              <p:ext uri="{386F3935-93C4-4BCD-93E2-E3B085C9AB24}">
+                <p16:designElem xmlns:p16="http://schemas.microsoft.com/office/powerpoint/2015/main" val="1"/>
+              </p:ext>
+            </p:extLst>
+          </p:nvPr>
+        </p:nvSpPr>
+        <p:spPr>
+          <a:xfrm>
+            <a:off x="4904534" y="-8467"/>
+            <a:ext cx="2588558" cy="6866467"/>
+          </a:xfrm>
+          <a:custGeom>
+            <a:avLst/>
+            <a:gdLst/>
+            <a:ahLst/>
+            <a:cxnLst/>
+            <a:rect l="l" t="t" r="r" b="b"/>
+            <a:pathLst>
+              <a:path w="2573311" h="6866467">
+                <a:moveTo>
+                  <a:pt x="0" y="0"/>
+                </a:moveTo>
+                <a:lnTo>
+                  <a:pt x="2573311" y="0"/>
+                </a:lnTo>
+                <a:lnTo>
+                  <a:pt x="2573311" y="6866467"/>
+                </a:lnTo>
+                <a:lnTo>
+                  <a:pt x="1202336" y="6866467"/>
+                </a:lnTo>
+                <a:lnTo>
+                  <a:pt x="0" y="0"/>
+                </a:lnTo>
+                <a:close/>
+              </a:path>
+            </a:pathLst>
+          </a:custGeom>
+          <a:solidFill>
+            <a:schemeClr val="accent1">
+              <a:alpha val="20000"/>
+            </a:schemeClr>
+          </a:solidFill>
+          <a:ln>
+            <a:noFill/>
+          </a:ln>
+          <a:effectLst/>
+        </p:spPr>
+        <p:style>
+          <a:lnRef idx="1">
+            <a:schemeClr val="accent1"/>
+          </a:lnRef>
+          <a:fillRef idx="3">
+            <a:schemeClr val="accent1"/>
+          </a:fillRef>
+          <a:effectRef idx="2">
+            <a:schemeClr val="accent1"/>
+          </a:effectRef>
+          <a:fontRef idx="minor">
+            <a:schemeClr val="lt1"/>
+          </a:fontRef>
+        </p:style>
+      </p:sp>
+      <p:sp>
+        <p:nvSpPr>
+          <p:cNvPr id="22" name="Isosceles Triangle 21">
+            <a:extLst>
+              <a:ext uri="{FF2B5EF4-FFF2-40B4-BE49-F238E27FC236}">
+                <a16:creationId xmlns:a16="http://schemas.microsoft.com/office/drawing/2014/main" id="{A032553A-72E8-4B0D-8405-FF9771C9AF05}"/>
+              </a:ext>
+              <a:ext uri="{C183D7F6-B498-43B3-948B-1728B52AA6E4}">
+                <adec:decorative xmlns:adec="http://schemas.microsoft.com/office/drawing/2017/decorative" val="1"/>
+              </a:ext>
+            </a:extLst>
+          </p:cNvPr>
+          <p:cNvSpPr>
+            <a:spLocks noGrp="1" noRot="1" noChangeAspect="1" noMove="1" noResize="1" noEditPoints="1" noAdjustHandles="1" noChangeArrowheads="1" noChangeShapeType="1" noTextEdit="1"/>
+          </p:cNvSpPr>
+          <p:nvPr>
+            <p:extLst>
+              <p:ext uri="{386F3935-93C4-4BCD-93E2-E3B085C9AB24}">
+                <p16:designElem xmlns:p16="http://schemas.microsoft.com/office/powerpoint/2015/main" val="1"/>
+              </p:ext>
+            </p:extLst>
+          </p:nvPr>
+        </p:nvSpPr>
+        <p:spPr>
+          <a:xfrm>
+            <a:off x="4233425" y="3048000"/>
+            <a:ext cx="3259667" cy="3810000"/>
+          </a:xfrm>
+          <a:prstGeom prst="triangle">
+            <a:avLst>
+              <a:gd name="adj" fmla="val 100000"/>
+            </a:avLst>
+          </a:prstGeom>
+          <a:solidFill>
+            <a:schemeClr val="accent2">
+              <a:alpha val="72000"/>
+            </a:schemeClr>
+          </a:solidFill>
+          <a:ln>
+            <a:noFill/>
+          </a:ln>
+          <a:effectLst/>
+        </p:spPr>
+        <p:style>
+          <a:lnRef idx="1">
+            <a:schemeClr val="accent1"/>
+          </a:lnRef>
+          <a:fillRef idx="3">
+            <a:schemeClr val="accent1"/>
+          </a:fillRef>
+          <a:effectRef idx="2">
+            <a:schemeClr val="accent1"/>
+          </a:effectRef>
+          <a:fontRef idx="minor">
+            <a:schemeClr val="lt1"/>
+          </a:fontRef>
+        </p:style>
+      </p:sp>
+      <p:sp>
+        <p:nvSpPr>
+          <p:cNvPr id="24" name="Rectangle 27">
+            <a:extLst>
+              <a:ext uri="{FF2B5EF4-FFF2-40B4-BE49-F238E27FC236}">
+                <a16:creationId xmlns:a16="http://schemas.microsoft.com/office/drawing/2014/main" id="{765800AC-C3B9-498E-87BC-29FAE4C76B21}"/>
+              </a:ext>
+              <a:ext uri="{C183D7F6-B498-43B3-948B-1728B52AA6E4}">
+                <adec:decorative xmlns:adec="http://schemas.microsoft.com/office/drawing/2017/decorative" val="1"/>
+              </a:ext>
+            </a:extLst>
+          </p:cNvPr>
+          <p:cNvSpPr>
+            <a:spLocks noGrp="1" noRot="1" noChangeAspect="1" noMove="1" noResize="1" noEditPoints="1" noAdjustHandles="1" noChangeArrowheads="1" noChangeShapeType="1" noTextEdit="1"/>
+          </p:cNvSpPr>
+          <p:nvPr>
+            <p:extLst>
+              <p:ext uri="{386F3935-93C4-4BCD-93E2-E3B085C9AB24}">
+                <p16:designElem xmlns:p16="http://schemas.microsoft.com/office/powerpoint/2015/main" val="1"/>
+              </p:ext>
+            </p:extLst>
+          </p:nvPr>
+        </p:nvSpPr>
+        <p:spPr>
+          <a:xfrm>
+            <a:off x="4635592" y="-8467"/>
+            <a:ext cx="2854326" cy="6866467"/>
+          </a:xfrm>
+          <a:custGeom>
+            <a:avLst/>
+            <a:gdLst/>
+            <a:ahLst/>
+            <a:cxnLst/>
+            <a:rect l="l" t="t" r="r" b="b"/>
+            <a:pathLst>
+              <a:path w="2858013" h="6866467">
+                <a:moveTo>
+                  <a:pt x="0" y="0"/>
+                </a:moveTo>
+                <a:lnTo>
+                  <a:pt x="2858013" y="0"/>
+                </a:lnTo>
+                <a:lnTo>
+                  <a:pt x="2858013" y="6866467"/>
+                </a:lnTo>
+                <a:lnTo>
+                  <a:pt x="2473942" y="6866467"/>
+                </a:lnTo>
+                <a:lnTo>
+                  <a:pt x="0" y="0"/>
+                </a:lnTo>
+                <a:close/>
+              </a:path>
+            </a:pathLst>
+          </a:custGeom>
+          <a:solidFill>
+            <a:schemeClr val="accent2">
+              <a:lumMod val="75000"/>
+              <a:alpha val="70000"/>
+            </a:schemeClr>
+          </a:solidFill>
+          <a:ln>
+            <a:noFill/>
+          </a:ln>
+          <a:effectLst/>
+        </p:spPr>
+        <p:style>
+          <a:lnRef idx="1">
+            <a:schemeClr val="accent1"/>
+          </a:lnRef>
+          <a:fillRef idx="3">
+            <a:schemeClr val="accent1"/>
+          </a:fillRef>
+          <a:effectRef idx="2">
+            <a:schemeClr val="accent1"/>
+          </a:effectRef>
+          <a:fontRef idx="minor">
+            <a:schemeClr val="lt1"/>
+          </a:fontRef>
+        </p:style>
+      </p:sp>
+      <p:sp>
+        <p:nvSpPr>
+          <p:cNvPr id="26" name="Isosceles Triangle 25">
+            <a:extLst>
+              <a:ext uri="{FF2B5EF4-FFF2-40B4-BE49-F238E27FC236}">
+                <a16:creationId xmlns:a16="http://schemas.microsoft.com/office/drawing/2014/main" id="{1F9D6ACB-2FF4-49F9-978A-E0D5327FC635}"/>
+              </a:ext>
+              <a:ext uri="{C183D7F6-B498-43B3-948B-1728B52AA6E4}">
+                <adec:decorative xmlns:adec="http://schemas.microsoft.com/office/drawing/2017/decorative" val="1"/>
+              </a:ext>
+            </a:extLst>
+          </p:cNvPr>
+          <p:cNvSpPr>
+            <a:spLocks noGrp="1" noRot="1" noChangeAspect="1" noMove="1" noResize="1" noEditPoints="1" noAdjustHandles="1" noChangeArrowheads="1" noChangeShapeType="1" noTextEdit="1"/>
+          </p:cNvSpPr>
+          <p:nvPr>
+            <p:extLst>
+              <p:ext uri="{386F3935-93C4-4BCD-93E2-E3B085C9AB24}">
+                <p16:designElem xmlns:p16="http://schemas.microsoft.com/office/powerpoint/2015/main" val="1"/>
+              </p:ext>
+            </p:extLst>
+          </p:nvPr>
+        </p:nvSpPr>
+        <p:spPr>
+          <a:xfrm>
+            <a:off x="5672758" y="3589867"/>
+            <a:ext cx="1817159" cy="3268133"/>
+          </a:xfrm>
+          <a:prstGeom prst="triangle">
+            <a:avLst>
+              <a:gd name="adj" fmla="val 100000"/>
+            </a:avLst>
+          </a:prstGeom>
+          <a:solidFill>
+            <a:schemeClr val="accent1">
+              <a:alpha val="80000"/>
+            </a:schemeClr>
+          </a:solidFill>
+          <a:ln>
+            <a:noFill/>
+          </a:ln>
+          <a:effectLst/>
+        </p:spPr>
+        <p:style>
+          <a:lnRef idx="1">
+            <a:schemeClr val="accent1"/>
+          </a:lnRef>
+          <a:fillRef idx="3">
+            <a:schemeClr val="accent1"/>
+          </a:fillRef>
+          <a:effectRef idx="2">
+            <a:schemeClr val="accent1"/>
+          </a:effectRef>
+          <a:fontRef idx="minor">
+            <a:schemeClr val="lt1"/>
+          </a:fontRef>
+        </p:style>
+      </p:sp>
+      <p:sp>
+        <p:nvSpPr>
+          <p:cNvPr id="28" name="Freeform: Shape 27">
+            <a:extLst>
+              <a:ext uri="{FF2B5EF4-FFF2-40B4-BE49-F238E27FC236}">
+                <a16:creationId xmlns:a16="http://schemas.microsoft.com/office/drawing/2014/main" id="{A5EC319D-0FEA-4B95-A3EA-01E35672C95B}"/>
+              </a:ext>
+              <a:ext uri="{C183D7F6-B498-43B3-948B-1728B52AA6E4}">
+                <adec:decorative xmlns:adec="http://schemas.microsoft.com/office/drawing/2017/decorative" val="1"/>
+              </a:ext>
+            </a:extLst>
+          </p:cNvPr>
+          <p:cNvSpPr>
+            <a:spLocks noGrp="1" noRot="1" noChangeAspect="1" noMove="1" noResize="1" noEditPoints="1" noAdjustHandles="1" noChangeArrowheads="1" noChangeShapeType="1" noTextEdit="1"/>
+          </p:cNvSpPr>
+          <p:nvPr>
+            <p:extLst>
+              <p:ext uri="{386F3935-93C4-4BCD-93E2-E3B085C9AB24}">
+                <p16:designElem xmlns:p16="http://schemas.microsoft.com/office/powerpoint/2015/main" val="1"/>
+              </p:ext>
+            </p:extLst>
+          </p:nvPr>
+        </p:nvSpPr>
+        <p:spPr>
+          <a:xfrm>
+            <a:off x="6197631" y="-8467"/>
+            <a:ext cx="5994369" cy="6866467"/>
+          </a:xfrm>
+          <a:custGeom>
+            <a:avLst/>
+            <a:gdLst>
+              <a:gd name="connsiteX0" fmla="*/ 0 w 5994369"/>
+              <a:gd name="connsiteY0" fmla="*/ 0 h 6866467"/>
+              <a:gd name="connsiteX1" fmla="*/ 1249825 w 5994369"/>
+              <a:gd name="connsiteY1" fmla="*/ 0 h 6866467"/>
+              <a:gd name="connsiteX2" fmla="*/ 1249825 w 5994369"/>
+              <a:gd name="connsiteY2" fmla="*/ 8467 h 6866467"/>
+              <a:gd name="connsiteX3" fmla="*/ 5994369 w 5994369"/>
+              <a:gd name="connsiteY3" fmla="*/ 8467 h 6866467"/>
+              <a:gd name="connsiteX4" fmla="*/ 5994369 w 5994369"/>
+              <a:gd name="connsiteY4" fmla="*/ 6866467 h 6866467"/>
+              <a:gd name="connsiteX5" fmla="*/ 1249825 w 5994369"/>
+              <a:gd name="connsiteY5" fmla="*/ 6866467 h 6866467"/>
+              <a:gd name="connsiteX6" fmla="*/ 1109382 w 5994369"/>
+              <a:gd name="connsiteY6" fmla="*/ 6866467 h 6866467"/>
+            </a:gdLst>
+            <a:ahLst/>
+            <a:cxnLst>
+              <a:cxn ang="0">
+                <a:pos x="connsiteX0" y="connsiteY0"/>
+              </a:cxn>
+              <a:cxn ang="0">
+                <a:pos x="connsiteX1" y="connsiteY1"/>
+              </a:cxn>
+              <a:cxn ang="0">
+                <a:pos x="connsiteX2" y="connsiteY2"/>
+              </a:cxn>
+              <a:cxn ang="0">
+                <a:pos x="connsiteX3" y="connsiteY3"/>
+              </a:cxn>
+              <a:cxn ang="0">
+                <a:pos x="connsiteX4" y="connsiteY4"/>
+              </a:cxn>
+              <a:cxn ang="0">
+                <a:pos x="connsiteX5" y="connsiteY5"/>
+              </a:cxn>
+              <a:cxn ang="0">
+                <a:pos x="connsiteX6" y="connsiteY6"/>
+              </a:cxn>
+            </a:cxnLst>
+            <a:rect l="l" t="t" r="r" b="b"/>
+            <a:pathLst>
+              <a:path w="5994369" h="6866467">
+                <a:moveTo>
+                  <a:pt x="0" y="0"/>
+                </a:moveTo>
+                <a:lnTo>
+                  <a:pt x="1249825" y="0"/>
+                </a:lnTo>
+                <a:lnTo>
+                  <a:pt x="1249825" y="8467"/>
+                </a:lnTo>
+                <a:lnTo>
+                  <a:pt x="5994369" y="8467"/>
+                </a:lnTo>
+                <a:lnTo>
+                  <a:pt x="5994369" y="6866467"/>
+                </a:lnTo>
+                <a:lnTo>
+                  <a:pt x="1249825" y="6866467"/>
+                </a:lnTo>
+                <a:lnTo>
+                  <a:pt x="1109382" y="6866467"/>
+                </a:lnTo>
+                <a:close/>
+              </a:path>
+            </a:pathLst>
+          </a:custGeom>
+          <a:solidFill>
+            <a:schemeClr val="accent1"/>
+          </a:solidFill>
+          <a:ln>
+            <a:noFill/>
+          </a:ln>
+        </p:spPr>
+        <p:style>
+          <a:lnRef idx="2">
+            <a:schemeClr val="accent1">
+              <a:shade val="50000"/>
+            </a:schemeClr>
+          </a:lnRef>
+          <a:fillRef idx="1">
+            <a:schemeClr val="accent1"/>
+          </a:fillRef>
+          <a:effectRef idx="0">
+            <a:schemeClr val="accent1"/>
+          </a:effectRef>
+          <a:fontRef idx="minor">
+            <a:schemeClr val="lt1"/>
+          </a:fontRef>
+        </p:style>
+        <p:txBody>
+          <a:bodyPr wrap="square" rtlCol="0" anchor="ctr">
+            <a:noAutofit/>
+          </a:bodyPr>
+          <a:lstStyle/>
+          <a:p>
+            <a:pPr algn="ctr"/>
+            <a:endParaRPr lang="en-US"/>
+          </a:p>
+        </p:txBody>
+      </p:sp>
+      <p:sp>
+        <p:nvSpPr>
+          <p:cNvPr id="2" name="Nadpis 1">
+            <a:extLst>
+              <a:ext uri="{FF2B5EF4-FFF2-40B4-BE49-F238E27FC236}">
+                <a16:creationId xmlns:a16="http://schemas.microsoft.com/office/drawing/2014/main" id="{0D612F6D-14C3-4B2D-A39E-F1C4FC51294C}"/>
+              </a:ext>
+            </a:extLst>
+          </p:cNvPr>
+          <p:cNvSpPr>
+            <a:spLocks noGrp="1"/>
+          </p:cNvSpPr>
+          <p:nvPr>
+            <p:ph type="title"/>
+          </p:nvPr>
+        </p:nvSpPr>
+        <p:spPr>
+          <a:xfrm>
+            <a:off x="7181723" y="609600"/>
+            <a:ext cx="4512989" cy="2227730"/>
+          </a:xfrm>
+        </p:spPr>
+        <p:txBody>
+          <a:bodyPr anchor="ctr">
+            <a:normAutofit/>
+          </a:bodyPr>
+          <a:lstStyle/>
+          <a:p>
+            <a:r>
+              <a:rPr lang="cs-CZ">
+                <a:solidFill>
+                  <a:srgbClr val="FFFFFF"/>
+                </a:solidFill>
+              </a:rPr>
+              <a:t>Implementuj test</a:t>
+            </a:r>
+          </a:p>
+        </p:txBody>
+      </p:sp>
+      <p:pic>
+        <p:nvPicPr>
+          <p:cNvPr id="5" name="Obrázek 4">
+            <a:extLst>
+              <a:ext uri="{FF2B5EF4-FFF2-40B4-BE49-F238E27FC236}">
+                <a16:creationId xmlns:a16="http://schemas.microsoft.com/office/drawing/2014/main" id="{8484ABAF-AECB-4C79-9A77-681EAC192B5E}"/>
+              </a:ext>
+            </a:extLst>
+          </p:cNvPr>
+          <p:cNvPicPr>
+            <a:picLocks noChangeAspect="1"/>
+          </p:cNvPicPr>
+          <p:nvPr/>
+        </p:nvPicPr>
+        <p:blipFill>
+          <a:blip r:embed="rId2"/>
+          <a:stretch>
+            <a:fillRect/>
+          </a:stretch>
+        </p:blipFill>
+        <p:spPr>
+          <a:xfrm>
+            <a:off x="273261" y="1034685"/>
+            <a:ext cx="6008813" cy="5011552"/>
+          </a:xfrm>
+          <a:prstGeom prst="rect">
+            <a:avLst/>
+          </a:prstGeom>
+        </p:spPr>
+      </p:pic>
+      <p:sp>
+        <p:nvSpPr>
+          <p:cNvPr id="3" name="Zástupný symbol pro obsah 2">
+            <a:extLst>
+              <a:ext uri="{FF2B5EF4-FFF2-40B4-BE49-F238E27FC236}">
+                <a16:creationId xmlns:a16="http://schemas.microsoft.com/office/drawing/2014/main" id="{E7AEA9D8-51F5-4766-A1A0-7EFBD7BF0A6E}"/>
+              </a:ext>
+            </a:extLst>
+          </p:cNvPr>
+          <p:cNvSpPr>
+            <a:spLocks noGrp="1"/>
+          </p:cNvSpPr>
+          <p:nvPr>
+            <p:ph idx="1"/>
+          </p:nvPr>
+        </p:nvSpPr>
+        <p:spPr>
+          <a:xfrm>
+            <a:off x="7181725" y="2837329"/>
+            <a:ext cx="4512988" cy="3317938"/>
+          </a:xfrm>
+        </p:spPr>
+        <p:txBody>
+          <a:bodyPr anchor="t">
+            <a:normAutofit/>
+          </a:bodyPr>
+          <a:lstStyle/>
+          <a:p>
+            <a:r>
+              <a:rPr lang="cs-CZ">
+                <a:solidFill>
+                  <a:srgbClr val="FFFFFF"/>
+                </a:solidFill>
+              </a:rPr>
+              <a:t>@ExtendWith(SpringExtension::class)</a:t>
+            </a:r>
+          </a:p>
+          <a:p>
+            <a:endParaRPr lang="cs-CZ">
+              <a:solidFill>
+                <a:srgbClr val="FFFFFF"/>
+              </a:solidFill>
+            </a:endParaRPr>
+          </a:p>
+          <a:p>
+            <a:r>
+              <a:rPr lang="cs-CZ">
+                <a:solidFill>
+                  <a:srgbClr val="FFFFFF"/>
+                </a:solidFill>
+              </a:rPr>
+              <a:t>@ContextConfiguration – přidej produkční konfigurace komponent, které chceš testovat</a:t>
+            </a:r>
+          </a:p>
+          <a:p>
+            <a:endParaRPr lang="cs-CZ">
+              <a:solidFill>
+                <a:srgbClr val="FFFFFF"/>
+              </a:solidFill>
+            </a:endParaRPr>
+          </a:p>
+          <a:p>
+            <a:r>
+              <a:rPr lang="cs-CZ">
+                <a:solidFill>
+                  <a:srgbClr val="FFFFFF"/>
+                </a:solidFill>
+              </a:rPr>
+              <a:t>@ContextConfiguration – přidej testové konfigurace komponent, které chceš mockovat</a:t>
+            </a:r>
+          </a:p>
+        </p:txBody>
+      </p:sp>
+    </p:spTree>
+    <p:extLst>
+      <p:ext uri="{BB962C8B-B14F-4D97-AF65-F5344CB8AC3E}">
+        <p14:creationId xmlns:p14="http://schemas.microsoft.com/office/powerpoint/2010/main" val="1454265808"/>
+      </p:ext>
+    </p:extLst>
+  </p:cSld>
+  <p:clrMapOvr>
+    <a:masterClrMapping/>
+  </p:clrMapOvr>
+</p:sld>
+</file>
+
 <file path=ppt/slides/slide2.xml><?xml version="1.0" encoding="utf-8"?>
 <p:sld xmlns:a="http://schemas.openxmlformats.org/drawingml/2006/main" xmlns:r="http://schemas.openxmlformats.org/officeDocument/2006/relationships" xmlns:p="http://schemas.openxmlformats.org/presentationml/2006/main">
   <p:cSld>
@@ -12462,7 +13362,7 @@
             <a:pPr lvl="1"/>
             <a:r>
               <a:rPr lang="cs-CZ" dirty="0"/>
-              <a:t>chování vice jednotek dohromady                           </a:t>
+              <a:t>chování více jednotek dohromady                           </a:t>
             </a:r>
             <a:endParaRPr lang="cs-CZ" sz="1800" b="1" dirty="0">
               <a:solidFill>
@@ -17118,8 +18018,8 @@
         </p:blipFill>
         <p:spPr>
           <a:xfrm>
-            <a:off x="-57059" y="1242472"/>
-            <a:ext cx="6944238" cy="4785104"/>
+            <a:off x="702913" y="1243088"/>
+            <a:ext cx="5591582" cy="4785104"/>
           </a:xfrm>
           <a:prstGeom prst="rect">
             <a:avLst/>
@@ -17149,7 +18049,7 @@
         </p:spPr>
         <p:txBody>
           <a:bodyPr vert="horz" lIns="91440" tIns="45720" rIns="91440" bIns="45720" rtlCol="0" anchor="t">
-            <a:normAutofit lnSpcReduction="10000"/>
+            <a:normAutofit/>
           </a:bodyPr>
           <a:lstStyle/>
           <a:p>
@@ -17327,20 +18227,20 @@
               <a:t>Pro </a:t>
             </a:r>
             <a:r>
-              <a:rPr lang="en-US" sz="1700" dirty="0" err="1">
+              <a:rPr lang="cs-CZ" sz="1700" dirty="0" err="1">
                 <a:solidFill>
                   <a:srgbClr val="FFFFFF"/>
                 </a:solidFill>
               </a:rPr>
-              <a:t>integrační</a:t>
+              <a:t>mockovanou</a:t>
             </a:r>
             <a:r>
-              <a:rPr lang="en-US" sz="1700" dirty="0">
+              <a:rPr lang="cs-CZ" sz="1700" dirty="0">
                 <a:solidFill>
                   <a:srgbClr val="FFFFFF"/>
                 </a:solidFill>
               </a:rPr>
-              <a:t> test </a:t>
+              <a:t> komponentu </a:t>
             </a:r>
             <a:r>
               <a:rPr lang="en-US" sz="1700" dirty="0" err="1">
@@ -17365,306 +18265,6 @@
                 </a:solidFill>
               </a:rPr>
               <a:t>konfiguraci</a:t>
-            </a:r>
-            <a:endParaRPr lang="en-US" sz="1700" dirty="0">
-              <a:solidFill>
-                <a:srgbClr val="FFFFFF"/>
-              </a:solidFill>
-            </a:endParaRPr>
-          </a:p>
-          <a:p>
-            <a:pPr marL="285750" indent="-285750">
-              <a:lnSpc>
-                <a:spcPct val="90000"/>
-              </a:lnSpc>
-              <a:spcBef>
-                <a:spcPts val="1000"/>
-              </a:spcBef>
-              <a:buClr>
-                <a:schemeClr val="accent1"/>
-              </a:buClr>
-              <a:buSzPct val="80000"/>
-              <a:buFont typeface="Wingdings 3" charset="2"/>
-              <a:buChar char=""/>
-            </a:pPr>
-            <a:endParaRPr lang="cs-CZ" sz="1700" dirty="0">
-              <a:solidFill>
-                <a:srgbClr val="FFFFFF"/>
-              </a:solidFill>
-            </a:endParaRPr>
-          </a:p>
-          <a:p>
-            <a:pPr marL="285750" indent="-285750">
-              <a:lnSpc>
-                <a:spcPct val="90000"/>
-              </a:lnSpc>
-              <a:spcBef>
-                <a:spcPts val="1000"/>
-              </a:spcBef>
-              <a:buClr>
-                <a:schemeClr val="accent1"/>
-              </a:buClr>
-              <a:buSzPct val="80000"/>
-              <a:buFont typeface="Wingdings 3" charset="2"/>
-              <a:buChar char=""/>
-            </a:pPr>
-            <a:r>
-              <a:rPr lang="en-US" sz="1700" dirty="0" err="1">
-                <a:solidFill>
-                  <a:srgbClr val="FFFFFF"/>
-                </a:solidFill>
-              </a:rPr>
-              <a:t>Importovat</a:t>
-            </a:r>
-            <a:r>
-              <a:rPr lang="en-US" sz="1700" dirty="0">
-                <a:solidFill>
-                  <a:srgbClr val="FFFFFF"/>
-                </a:solidFill>
-              </a:rPr>
-              <a:t> </a:t>
-            </a:r>
-            <a:r>
-              <a:rPr lang="en-US" sz="1700" dirty="0" err="1">
-                <a:solidFill>
-                  <a:srgbClr val="FFFFFF"/>
-                </a:solidFill>
-              </a:rPr>
-              <a:t>produkční</a:t>
-            </a:r>
-            <a:r>
-              <a:rPr lang="en-US" sz="1700" dirty="0">
-                <a:solidFill>
-                  <a:srgbClr val="FFFFFF"/>
-                </a:solidFill>
-              </a:rPr>
-              <a:t> </a:t>
-            </a:r>
-            <a:r>
-              <a:rPr lang="en-US" sz="1700" dirty="0" err="1">
-                <a:solidFill>
-                  <a:srgbClr val="FFFFFF"/>
-                </a:solidFill>
-              </a:rPr>
-              <a:t>konfigurace</a:t>
-            </a:r>
-            <a:r>
-              <a:rPr lang="en-US" sz="1700" dirty="0">
-                <a:solidFill>
-                  <a:srgbClr val="FFFFFF"/>
-                </a:solidFill>
-              </a:rPr>
-              <a:t> </a:t>
-            </a:r>
-            <a:r>
-              <a:rPr lang="en-US" sz="1700" dirty="0" err="1">
-                <a:solidFill>
-                  <a:srgbClr val="FFFFFF"/>
-                </a:solidFill>
-              </a:rPr>
-              <a:t>komponent</a:t>
-            </a:r>
-            <a:r>
-              <a:rPr lang="en-US" sz="1700" dirty="0">
-                <a:solidFill>
-                  <a:srgbClr val="FFFFFF"/>
-                </a:solidFill>
-              </a:rPr>
-              <a:t>, </a:t>
-            </a:r>
-            <a:r>
-              <a:rPr lang="en-US" sz="1700" dirty="0" err="1">
-                <a:solidFill>
-                  <a:srgbClr val="FFFFFF"/>
-                </a:solidFill>
-              </a:rPr>
-              <a:t>které</a:t>
-            </a:r>
-            <a:r>
-              <a:rPr lang="en-US" sz="1700" dirty="0">
-                <a:solidFill>
-                  <a:srgbClr val="FFFFFF"/>
-                </a:solidFill>
-              </a:rPr>
-              <a:t> </a:t>
-            </a:r>
-            <a:r>
-              <a:rPr lang="en-US" sz="1700" dirty="0" err="1">
-                <a:solidFill>
-                  <a:srgbClr val="FFFFFF"/>
-                </a:solidFill>
-              </a:rPr>
-              <a:t>chceme</a:t>
-            </a:r>
-            <a:r>
-              <a:rPr lang="en-US" sz="1700" dirty="0">
-                <a:solidFill>
-                  <a:srgbClr val="FFFFFF"/>
-                </a:solidFill>
-              </a:rPr>
-              <a:t> </a:t>
-            </a:r>
-            <a:r>
-              <a:rPr lang="en-US" sz="1700" dirty="0" err="1">
-                <a:solidFill>
-                  <a:srgbClr val="FFFFFF"/>
-                </a:solidFill>
-              </a:rPr>
-              <a:t>testovat</a:t>
-            </a:r>
-            <a:r>
-              <a:rPr lang="en-US" sz="1700" dirty="0">
-                <a:solidFill>
-                  <a:srgbClr val="FFFFFF"/>
-                </a:solidFill>
-              </a:rPr>
-              <a:t> </a:t>
-            </a:r>
-            <a:endParaRPr lang="cs-CZ" sz="1700" dirty="0">
-              <a:solidFill>
-                <a:srgbClr val="FFFFFF"/>
-              </a:solidFill>
-            </a:endParaRPr>
-          </a:p>
-          <a:p>
-            <a:pPr marL="285750" indent="-285750">
-              <a:lnSpc>
-                <a:spcPct val="90000"/>
-              </a:lnSpc>
-              <a:spcBef>
-                <a:spcPts val="1000"/>
-              </a:spcBef>
-              <a:buClr>
-                <a:schemeClr val="accent1"/>
-              </a:buClr>
-              <a:buSzPct val="80000"/>
-              <a:buFont typeface="Wingdings 3" charset="2"/>
-              <a:buChar char=""/>
-            </a:pPr>
-            <a:endParaRPr lang="cs-CZ" sz="1700" dirty="0">
-              <a:solidFill>
-                <a:srgbClr val="FFFFFF"/>
-              </a:solidFill>
-            </a:endParaRPr>
-          </a:p>
-          <a:p>
-            <a:pPr marL="285750" indent="-285750">
-              <a:lnSpc>
-                <a:spcPct val="90000"/>
-              </a:lnSpc>
-              <a:spcBef>
-                <a:spcPts val="1000"/>
-              </a:spcBef>
-              <a:buClr>
-                <a:schemeClr val="accent1"/>
-              </a:buClr>
-              <a:buSzPct val="80000"/>
-              <a:buFont typeface="Wingdings 3" charset="2"/>
-              <a:buChar char=""/>
-            </a:pPr>
-            <a:r>
-              <a:rPr lang="cs-CZ" sz="1700" dirty="0">
-                <a:solidFill>
-                  <a:srgbClr val="FFFFFF"/>
-                </a:solidFill>
-              </a:rPr>
-              <a:t>Importovat</a:t>
-            </a:r>
-            <a:r>
-              <a:rPr lang="en-US" sz="1700" dirty="0">
-                <a:solidFill>
-                  <a:srgbClr val="FFFFFF"/>
-                </a:solidFill>
-              </a:rPr>
-              <a:t> </a:t>
-            </a:r>
-            <a:r>
-              <a:rPr lang="en-US" sz="1700" dirty="0" err="1">
-                <a:solidFill>
-                  <a:srgbClr val="FFFFFF"/>
-                </a:solidFill>
-              </a:rPr>
-              <a:t>testové</a:t>
-            </a:r>
-            <a:r>
-              <a:rPr lang="en-US" sz="1700" dirty="0">
-                <a:solidFill>
-                  <a:srgbClr val="FFFFFF"/>
-                </a:solidFill>
-              </a:rPr>
-              <a:t> </a:t>
-            </a:r>
-            <a:r>
-              <a:rPr lang="en-US" sz="1700" dirty="0" err="1">
-                <a:solidFill>
-                  <a:srgbClr val="FFFFFF"/>
-                </a:solidFill>
-              </a:rPr>
-              <a:t>konfigurace</a:t>
-            </a:r>
-            <a:r>
-              <a:rPr lang="en-US" sz="1700" dirty="0">
-                <a:solidFill>
-                  <a:srgbClr val="FFFFFF"/>
-                </a:solidFill>
-              </a:rPr>
-              <a:t> </a:t>
-            </a:r>
-            <a:r>
-              <a:rPr lang="en-US" sz="1700" dirty="0" err="1">
-                <a:solidFill>
-                  <a:srgbClr val="FFFFFF"/>
-                </a:solidFill>
-              </a:rPr>
-              <a:t>komponent</a:t>
-            </a:r>
-            <a:r>
-              <a:rPr lang="en-US" sz="1700" dirty="0">
-                <a:solidFill>
-                  <a:srgbClr val="FFFFFF"/>
-                </a:solidFill>
-              </a:rPr>
-              <a:t>, </a:t>
-            </a:r>
-            <a:r>
-              <a:rPr lang="en-US" sz="1700" dirty="0" err="1">
-                <a:solidFill>
-                  <a:srgbClr val="FFFFFF"/>
-                </a:solidFill>
-              </a:rPr>
-              <a:t>které</a:t>
-            </a:r>
-            <a:r>
-              <a:rPr lang="en-US" sz="1700" dirty="0">
-                <a:solidFill>
-                  <a:srgbClr val="FFFFFF"/>
-                </a:solidFill>
-              </a:rPr>
-              <a:t> </a:t>
-            </a:r>
-            <a:r>
-              <a:rPr lang="en-US" sz="1700" dirty="0" err="1">
-                <a:solidFill>
-                  <a:srgbClr val="FFFFFF"/>
-                </a:solidFill>
-              </a:rPr>
-              <a:t>chceme</a:t>
-            </a:r>
-            <a:r>
-              <a:rPr lang="en-US" sz="1700" dirty="0">
-                <a:solidFill>
-                  <a:srgbClr val="FFFFFF"/>
-                </a:solidFill>
-              </a:rPr>
-              <a:t> </a:t>
-            </a:r>
-            <a:r>
-              <a:rPr lang="en-US" sz="1700" dirty="0" err="1">
-                <a:solidFill>
-                  <a:srgbClr val="FFFFFF"/>
-                </a:solidFill>
-              </a:rPr>
-              <a:t>mockovat</a:t>
             </a:r>
             <a:endParaRPr lang="en-US" sz="1700" dirty="0">
               <a:solidFill>

</xml_diff>